<commit_message>
semi-finished ppt for presentation
</commit_message>
<xml_diff>
--- a/powerpoint.pptx
+++ b/powerpoint.pptx
@@ -5,7 +5,7 @@
     <p:sldMasterId id="2147483648" r:id="rId1"/>
   </p:sldMasterIdLst>
   <p:notesMasterIdLst>
-    <p:notesMasterId r:id="rId20"/>
+    <p:notesMasterId r:id="rId26"/>
   </p:notesMasterIdLst>
   <p:sldIdLst>
     <p:sldId id="256" r:id="rId2"/>
@@ -18,14 +18,20 @@
     <p:sldId id="273" r:id="rId9"/>
     <p:sldId id="267" r:id="rId10"/>
     <p:sldId id="268" r:id="rId11"/>
-    <p:sldId id="262" r:id="rId12"/>
-    <p:sldId id="263" r:id="rId13"/>
+    <p:sldId id="274" r:id="rId12"/>
+    <p:sldId id="262" r:id="rId13"/>
     <p:sldId id="264" r:id="rId14"/>
     <p:sldId id="265" r:id="rId15"/>
-    <p:sldId id="266" r:id="rId16"/>
-    <p:sldId id="269" r:id="rId17"/>
-    <p:sldId id="270" r:id="rId18"/>
-    <p:sldId id="271" r:id="rId19"/>
+    <p:sldId id="278" r:id="rId16"/>
+    <p:sldId id="279" r:id="rId17"/>
+    <p:sldId id="280" r:id="rId18"/>
+    <p:sldId id="266" r:id="rId19"/>
+    <p:sldId id="269" r:id="rId20"/>
+    <p:sldId id="270" r:id="rId21"/>
+    <p:sldId id="275" r:id="rId22"/>
+    <p:sldId id="276" r:id="rId23"/>
+    <p:sldId id="277" r:id="rId24"/>
+    <p:sldId id="263" r:id="rId25"/>
   </p:sldIdLst>
   <p:sldSz cx="9144000" cy="6858000" type="screen4x3"/>
   <p:notesSz cx="6858000" cy="9144000"/>
@@ -209,7 +215,8 @@
           <a:p>
             <a:fld id="{4CB3315F-0A10-4DEF-AC67-BCDBA1C482DF}" type="datetimeFigureOut">
               <a:rPr lang="en-GB" smtClean="0"/>
-              <a:t>01/11/2014</a:t>
+              <a:pPr/>
+              <a:t>02/11/2014</a:t>
             </a:fld>
             <a:endParaRPr lang="en-GB"/>
           </a:p>
@@ -370,6 +377,7 @@
           <a:p>
             <a:fld id="{74EAF850-785E-4110-9A5A-A40C7E9D73BD}" type="slidenum">
               <a:rPr lang="en-GB" smtClean="0"/>
+              <a:pPr/>
               <a:t>‹#›</a:t>
             </a:fld>
             <a:endParaRPr lang="en-GB"/>
@@ -379,7 +387,7 @@
     </p:spTree>
     <p:extLst>
       <p:ext uri="{BB962C8B-B14F-4D97-AF65-F5344CB8AC3E}">
-        <p14:creationId xmlns:p14="http://schemas.microsoft.com/office/powerpoint/2010/main" val="2825561085"/>
+        <p14:creationId xmlns="" xmlns:p14="http://schemas.microsoft.com/office/powerpoint/2010/main" val="2825561085"/>
       </p:ext>
     </p:extLst>
   </p:cSld>
@@ -546,7 +554,102 @@
           <a:p>
             <a:fld id="{74EAF850-785E-4110-9A5A-A40C7E9D73BD}" type="slidenum">
               <a:rPr lang="en-GB" smtClean="0"/>
+              <a:pPr/>
               <a:t>2</a:t>
+            </a:fld>
+            <a:endParaRPr lang="en-GB"/>
+          </a:p>
+        </p:txBody>
+      </p:sp>
+    </p:spTree>
+  </p:cSld>
+  <p:clrMapOvr>
+    <a:masterClrMapping/>
+  </p:clrMapOvr>
+</p:notes>
+</file>
+
+<file path=ppt/notesSlides/notesSlide2.xml><?xml version="1.0" encoding="utf-8"?>
+<p:notes xmlns:a="http://schemas.openxmlformats.org/drawingml/2006/main" xmlns:r="http://schemas.openxmlformats.org/officeDocument/2006/relationships" xmlns:p="http://schemas.openxmlformats.org/presentationml/2006/main">
+  <p:cSld>
+    <p:spTree>
+      <p:nvGrpSpPr>
+        <p:cNvPr id="1" name=""/>
+        <p:cNvGrpSpPr/>
+        <p:nvPr/>
+      </p:nvGrpSpPr>
+      <p:grpSpPr>
+        <a:xfrm>
+          <a:off x="0" y="0"/>
+          <a:ext cx="0" cy="0"/>
+          <a:chOff x="0" y="0"/>
+          <a:chExt cx="0" cy="0"/>
+        </a:xfrm>
+      </p:grpSpPr>
+      <p:sp>
+        <p:nvSpPr>
+          <p:cNvPr id="2" name="Slide Image Placeholder 1"/>
+          <p:cNvSpPr>
+            <a:spLocks noGrp="1" noRot="1" noChangeAspect="1"/>
+          </p:cNvSpPr>
+          <p:nvPr>
+            <p:ph type="sldImg"/>
+          </p:nvPr>
+        </p:nvSpPr>
+        <p:spPr/>
+      </p:sp>
+      <p:sp>
+        <p:nvSpPr>
+          <p:cNvPr id="3" name="Notes Placeholder 2"/>
+          <p:cNvSpPr>
+            <a:spLocks noGrp="1"/>
+          </p:cNvSpPr>
+          <p:nvPr>
+            <p:ph type="body" idx="1"/>
+          </p:nvPr>
+        </p:nvSpPr>
+        <p:spPr/>
+        <p:txBody>
+          <a:bodyPr>
+            <a:normAutofit/>
+          </a:bodyPr>
+          <a:lstStyle/>
+          <a:p>
+            <a:r>
+              <a:rPr lang="en-GB" dirty="0" smtClean="0"/>
+              <a:t>Couldn’t get a step response from the structure, because force and signal to transducer were not in sync</a:t>
+            </a:r>
+          </a:p>
+          <a:p>
+            <a:r>
+              <a:rPr lang="en-GB" dirty="0" smtClean="0"/>
+              <a:t>Got data from the original under a frequency sweep</a:t>
+            </a:r>
+          </a:p>
+          <a:p>
+            <a:endParaRPr lang="en-GB" dirty="0"/>
+          </a:p>
+        </p:txBody>
+      </p:sp>
+      <p:sp>
+        <p:nvSpPr>
+          <p:cNvPr id="4" name="Slide Number Placeholder 3"/>
+          <p:cNvSpPr>
+            <a:spLocks noGrp="1"/>
+          </p:cNvSpPr>
+          <p:nvPr>
+            <p:ph type="sldNum" sz="quarter" idx="10"/>
+          </p:nvPr>
+        </p:nvSpPr>
+        <p:spPr/>
+        <p:txBody>
+          <a:bodyPr/>
+          <a:lstStyle/>
+          <a:p>
+            <a:fld id="{74EAF850-785E-4110-9A5A-A40C7E9D73BD}" type="slidenum">
+              <a:rPr lang="en-GB" smtClean="0"/>
+              <a:pPr/>
+              <a:t>10</a:t>
             </a:fld>
             <a:endParaRPr lang="en-GB"/>
           </a:p>
@@ -741,7 +844,8 @@
           <a:p>
             <a:fld id="{77FBBBD1-1E54-4BE2-A488-F65954C7CEA5}" type="datetimeFigureOut">
               <a:rPr lang="en-GB" smtClean="0"/>
-              <a:t>01/11/2014</a:t>
+              <a:pPr/>
+              <a:t>02/11/2014</a:t>
             </a:fld>
             <a:endParaRPr lang="en-GB"/>
           </a:p>
@@ -783,6 +887,7 @@
           <a:p>
             <a:fld id="{0B7ABC80-637C-4206-9773-A5A2DD7DBE4A}" type="slidenum">
               <a:rPr lang="en-GB" smtClean="0"/>
+              <a:pPr/>
               <a:t>‹#›</a:t>
             </a:fld>
             <a:endParaRPr lang="en-GB"/>
@@ -906,7 +1011,8 @@
           <a:p>
             <a:fld id="{77FBBBD1-1E54-4BE2-A488-F65954C7CEA5}" type="datetimeFigureOut">
               <a:rPr lang="en-GB" smtClean="0"/>
-              <a:t>01/11/2014</a:t>
+              <a:pPr/>
+              <a:t>02/11/2014</a:t>
             </a:fld>
             <a:endParaRPr lang="en-GB"/>
           </a:p>
@@ -948,6 +1054,7 @@
           <a:p>
             <a:fld id="{0B7ABC80-637C-4206-9773-A5A2DD7DBE4A}" type="slidenum">
               <a:rPr lang="en-GB" smtClean="0"/>
+              <a:pPr/>
               <a:t>‹#›</a:t>
             </a:fld>
             <a:endParaRPr lang="en-GB"/>
@@ -1081,7 +1188,8 @@
           <a:p>
             <a:fld id="{77FBBBD1-1E54-4BE2-A488-F65954C7CEA5}" type="datetimeFigureOut">
               <a:rPr lang="en-GB" smtClean="0"/>
-              <a:t>01/11/2014</a:t>
+              <a:pPr/>
+              <a:t>02/11/2014</a:t>
             </a:fld>
             <a:endParaRPr lang="en-GB"/>
           </a:p>
@@ -1123,6 +1231,7 @@
           <a:p>
             <a:fld id="{0B7ABC80-637C-4206-9773-A5A2DD7DBE4A}" type="slidenum">
               <a:rPr lang="en-GB" smtClean="0"/>
+              <a:pPr/>
               <a:t>‹#›</a:t>
             </a:fld>
             <a:endParaRPr lang="en-GB"/>
@@ -1246,7 +1355,8 @@
           <a:p>
             <a:fld id="{77FBBBD1-1E54-4BE2-A488-F65954C7CEA5}" type="datetimeFigureOut">
               <a:rPr lang="en-GB" smtClean="0"/>
-              <a:t>01/11/2014</a:t>
+              <a:pPr/>
+              <a:t>02/11/2014</a:t>
             </a:fld>
             <a:endParaRPr lang="en-GB"/>
           </a:p>
@@ -1288,6 +1398,7 @@
           <a:p>
             <a:fld id="{0B7ABC80-637C-4206-9773-A5A2DD7DBE4A}" type="slidenum">
               <a:rPr lang="en-GB" smtClean="0"/>
+              <a:pPr/>
               <a:t>‹#›</a:t>
             </a:fld>
             <a:endParaRPr lang="en-GB"/>
@@ -1487,7 +1598,8 @@
           <a:p>
             <a:fld id="{77FBBBD1-1E54-4BE2-A488-F65954C7CEA5}" type="datetimeFigureOut">
               <a:rPr lang="en-GB" smtClean="0"/>
-              <a:t>01/11/2014</a:t>
+              <a:pPr/>
+              <a:t>02/11/2014</a:t>
             </a:fld>
             <a:endParaRPr lang="en-GB"/>
           </a:p>
@@ -1529,6 +1641,7 @@
           <a:p>
             <a:fld id="{0B7ABC80-637C-4206-9773-A5A2DD7DBE4A}" type="slidenum">
               <a:rPr lang="en-GB" smtClean="0"/>
+              <a:pPr/>
               <a:t>‹#›</a:t>
             </a:fld>
             <a:endParaRPr lang="en-GB"/>
@@ -1770,7 +1883,8 @@
           <a:p>
             <a:fld id="{77FBBBD1-1E54-4BE2-A488-F65954C7CEA5}" type="datetimeFigureOut">
               <a:rPr lang="en-GB" smtClean="0"/>
-              <a:t>01/11/2014</a:t>
+              <a:pPr/>
+              <a:t>02/11/2014</a:t>
             </a:fld>
             <a:endParaRPr lang="en-GB"/>
           </a:p>
@@ -1812,6 +1926,7 @@
           <a:p>
             <a:fld id="{0B7ABC80-637C-4206-9773-A5A2DD7DBE4A}" type="slidenum">
               <a:rPr lang="en-GB" smtClean="0"/>
+              <a:pPr/>
               <a:t>‹#›</a:t>
             </a:fld>
             <a:endParaRPr lang="en-GB"/>
@@ -2187,7 +2302,8 @@
           <a:p>
             <a:fld id="{77FBBBD1-1E54-4BE2-A488-F65954C7CEA5}" type="datetimeFigureOut">
               <a:rPr lang="en-GB" smtClean="0"/>
-              <a:t>01/11/2014</a:t>
+              <a:pPr/>
+              <a:t>02/11/2014</a:t>
             </a:fld>
             <a:endParaRPr lang="en-GB"/>
           </a:p>
@@ -2229,6 +2345,7 @@
           <a:p>
             <a:fld id="{0B7ABC80-637C-4206-9773-A5A2DD7DBE4A}" type="slidenum">
               <a:rPr lang="en-GB" smtClean="0"/>
+              <a:pPr/>
               <a:t>‹#›</a:t>
             </a:fld>
             <a:endParaRPr lang="en-GB"/>
@@ -2300,7 +2417,8 @@
           <a:p>
             <a:fld id="{77FBBBD1-1E54-4BE2-A488-F65954C7CEA5}" type="datetimeFigureOut">
               <a:rPr lang="en-GB" smtClean="0"/>
-              <a:t>01/11/2014</a:t>
+              <a:pPr/>
+              <a:t>02/11/2014</a:t>
             </a:fld>
             <a:endParaRPr lang="en-GB"/>
           </a:p>
@@ -2342,6 +2460,7 @@
           <a:p>
             <a:fld id="{0B7ABC80-637C-4206-9773-A5A2DD7DBE4A}" type="slidenum">
               <a:rPr lang="en-GB" smtClean="0"/>
+              <a:pPr/>
               <a:t>‹#›</a:t>
             </a:fld>
             <a:endParaRPr lang="en-GB"/>
@@ -2390,7 +2509,8 @@
           <a:p>
             <a:fld id="{77FBBBD1-1E54-4BE2-A488-F65954C7CEA5}" type="datetimeFigureOut">
               <a:rPr lang="en-GB" smtClean="0"/>
-              <a:t>01/11/2014</a:t>
+              <a:pPr/>
+              <a:t>02/11/2014</a:t>
             </a:fld>
             <a:endParaRPr lang="en-GB"/>
           </a:p>
@@ -2432,6 +2552,7 @@
           <a:p>
             <a:fld id="{0B7ABC80-637C-4206-9773-A5A2DD7DBE4A}" type="slidenum">
               <a:rPr lang="en-GB" smtClean="0"/>
+              <a:pPr/>
               <a:t>‹#›</a:t>
             </a:fld>
             <a:endParaRPr lang="en-GB"/>
@@ -2662,7 +2783,8 @@
           <a:p>
             <a:fld id="{77FBBBD1-1E54-4BE2-A488-F65954C7CEA5}" type="datetimeFigureOut">
               <a:rPr lang="en-GB" smtClean="0"/>
-              <a:t>01/11/2014</a:t>
+              <a:pPr/>
+              <a:t>02/11/2014</a:t>
             </a:fld>
             <a:endParaRPr lang="en-GB"/>
           </a:p>
@@ -2704,6 +2826,7 @@
           <a:p>
             <a:fld id="{0B7ABC80-637C-4206-9773-A5A2DD7DBE4A}" type="slidenum">
               <a:rPr lang="en-GB" smtClean="0"/>
+              <a:pPr/>
               <a:t>‹#›</a:t>
             </a:fld>
             <a:endParaRPr lang="en-GB"/>
@@ -2910,7 +3033,8 @@
           <a:p>
             <a:fld id="{77FBBBD1-1E54-4BE2-A488-F65954C7CEA5}" type="datetimeFigureOut">
               <a:rPr lang="en-GB" smtClean="0"/>
-              <a:t>01/11/2014</a:t>
+              <a:pPr/>
+              <a:t>02/11/2014</a:t>
             </a:fld>
             <a:endParaRPr lang="en-GB"/>
           </a:p>
@@ -2952,6 +3076,7 @@
           <a:p>
             <a:fld id="{0B7ABC80-637C-4206-9773-A5A2DD7DBE4A}" type="slidenum">
               <a:rPr lang="en-GB" smtClean="0"/>
+              <a:pPr/>
               <a:t>‹#›</a:t>
             </a:fld>
             <a:endParaRPr lang="en-GB"/>
@@ -3118,7 +3243,8 @@
           <a:p>
             <a:fld id="{77FBBBD1-1E54-4BE2-A488-F65954C7CEA5}" type="datetimeFigureOut">
               <a:rPr lang="en-GB" smtClean="0"/>
-              <a:t>01/11/2014</a:t>
+              <a:pPr/>
+              <a:t>02/11/2014</a:t>
             </a:fld>
             <a:endParaRPr lang="en-GB"/>
           </a:p>
@@ -3196,6 +3322,7 @@
           <a:p>
             <a:fld id="{0B7ABC80-637C-4206-9773-A5A2DD7DBE4A}" type="slidenum">
               <a:rPr lang="en-GB" smtClean="0"/>
+              <a:pPr/>
               <a:t>‹#›</a:t>
             </a:fld>
             <a:endParaRPr lang="en-GB"/>
@@ -3523,12 +3650,21 @@
             <p:ph type="subTitle" idx="1"/>
           </p:nvPr>
         </p:nvSpPr>
-        <p:spPr/>
+        <p:spPr>
+          <a:xfrm>
+            <a:off x="1403648" y="4581128"/>
+            <a:ext cx="6400800" cy="694928"/>
+          </a:xfrm>
+        </p:spPr>
         <p:txBody>
           <a:bodyPr/>
           <a:lstStyle/>
           <a:p>
-            <a:endParaRPr lang="en-GB"/>
+            <a:r>
+              <a:rPr lang="en-GB" dirty="0" smtClean="0"/>
+              <a:t>Eric Wieser and Ajinkya Bhalerao</a:t>
+            </a:r>
+            <a:endParaRPr lang="en-GB" dirty="0"/>
           </a:p>
         </p:txBody>
       </p:sp>
@@ -3587,40 +3723,46 @@
           </a:p>
         </p:txBody>
       </p:sp>
-      <p:sp>
-        <p:nvSpPr>
-          <p:cNvPr id="5" name="Content Placeholder 4"/>
-          <p:cNvSpPr>
-            <a:spLocks noGrp="1"/>
-          </p:cNvSpPr>
+      <p:pic>
+        <p:nvPicPr>
+          <p:cNvPr id="6" name="Picture 2" descr="C:\Users\Home\Documents\docs\stuff from uni\year 2 cambridge\cued-icw\graphs\verify.png"/>
+          <p:cNvPicPr>
+            <a:picLocks noGrp="1" noChangeAspect="1" noChangeArrowheads="1"/>
+          </p:cNvPicPr>
           <p:nvPr>
             <p:ph idx="1"/>
           </p:nvPr>
-        </p:nvSpPr>
-        <p:spPr/>
-        <p:txBody>
-          <a:bodyPr/>
-          <a:lstStyle/>
-          <a:p>
-            <a:r>
-              <a:rPr lang="en-GB" dirty="0" smtClean="0"/>
-              <a:t>Couldn’t get a step response from the structure, because force and signal to transducer were not in sync</a:t>
-            </a:r>
-          </a:p>
-          <a:p>
-            <a:r>
-              <a:rPr lang="en-GB" dirty="0" smtClean="0"/>
-              <a:t>Got data from the original under a frequency sweep</a:t>
-            </a:r>
-            <a:endParaRPr lang="en-GB" dirty="0"/>
-          </a:p>
-        </p:txBody>
-      </p:sp>
+        </p:nvPicPr>
+        <p:blipFill>
+          <a:blip r:embed="rId3" cstate="print"/>
+          <a:srcRect/>
+          <a:stretch>
+            <a:fillRect/>
+          </a:stretch>
+        </p:blipFill>
+        <p:spPr bwMode="auto">
+          <a:xfrm>
+            <a:off x="1554691" y="1600200"/>
+            <a:ext cx="6034618" cy="4525963"/>
+          </a:xfrm>
+          <a:prstGeom prst="rect">
+            <a:avLst/>
+          </a:prstGeom>
+          <a:noFill/>
+        </p:spPr>
+      </p:pic>
     </p:spTree>
   </p:cSld>
   <p:clrMapOvr>
     <a:masterClrMapping/>
   </p:clrMapOvr>
+  <p:timing>
+    <p:tnLst>
+      <p:par>
+        <p:cTn id="1" dur="indefinite" restart="never" nodeType="tmRoot"/>
+      </p:par>
+    </p:tnLst>
+  </p:timing>
 </p:sld>
 </file>
 
@@ -3643,7 +3785,7 @@
       </p:grpSpPr>
       <p:sp>
         <p:nvSpPr>
-          <p:cNvPr id="4" name="Title 3"/>
+          <p:cNvPr id="2" name="Title 1"/>
           <p:cNvSpPr>
             <a:spLocks noGrp="1"/>
           </p:cNvSpPr>
@@ -3653,41 +3795,59 @@
         </p:nvSpPr>
         <p:spPr/>
         <p:txBody>
-          <a:bodyPr/>
+          <a:bodyPr>
+            <a:normAutofit fontScale="90000"/>
+          </a:bodyPr>
           <a:lstStyle/>
           <a:p>
             <a:r>
               <a:rPr lang="en-GB" dirty="0" smtClean="0"/>
-              <a:t>Adding absorbers to the model</a:t>
+              <a:t>Displacement-time graphs of model</a:t>
             </a:r>
             <a:endParaRPr lang="en-GB" dirty="0"/>
           </a:p>
         </p:txBody>
       </p:sp>
-      <p:sp>
-        <p:nvSpPr>
-          <p:cNvPr id="5" name="Text Placeholder 4"/>
-          <p:cNvSpPr>
-            <a:spLocks noGrp="1"/>
-          </p:cNvSpPr>
-          <p:nvPr>
-            <p:ph type="body" idx="1"/>
-          </p:nvPr>
-        </p:nvSpPr>
-        <p:spPr/>
-        <p:txBody>
-          <a:bodyPr/>
-          <a:lstStyle/>
-          <a:p>
-            <a:endParaRPr lang="en-GB"/>
-          </a:p>
-        </p:txBody>
-      </p:sp>
+      <p:pic>
+        <p:nvPicPr>
+          <p:cNvPr id="4098" name="Picture 2" descr="C:\Users\Home\Documents\docs\stuff from uni\year 2 cambridge\cued-icw\graphs\disp-all.png"/>
+          <p:cNvPicPr>
+            <a:picLocks noGrp="1" noChangeAspect="1" noChangeArrowheads="1"/>
+          </p:cNvPicPr>
+          <p:nvPr>
+            <p:ph idx="1"/>
+          </p:nvPr>
+        </p:nvPicPr>
+        <p:blipFill>
+          <a:blip r:embed="rId2" cstate="print"/>
+          <a:srcRect/>
+          <a:stretch>
+            <a:fillRect/>
+          </a:stretch>
+        </p:blipFill>
+        <p:spPr bwMode="auto">
+          <a:xfrm>
+            <a:off x="1554691" y="1600200"/>
+            <a:ext cx="6034618" cy="4525963"/>
+          </a:xfrm>
+          <a:prstGeom prst="rect">
+            <a:avLst/>
+          </a:prstGeom>
+          <a:noFill/>
+        </p:spPr>
+      </p:pic>
     </p:spTree>
   </p:cSld>
   <p:clrMapOvr>
     <a:masterClrMapping/>
   </p:clrMapOvr>
+  <p:timing>
+    <p:tnLst>
+      <p:par>
+        <p:cTn id="1" dur="indefinite" restart="never" nodeType="tmRoot"/>
+      </p:par>
+    </p:tnLst>
+  </p:timing>
 </p:sld>
 </file>
 
@@ -3725,7 +3885,7 @@
           <a:p>
             <a:r>
               <a:rPr lang="en-GB" dirty="0" smtClean="0"/>
-              <a:t>Damping resonant peaks</a:t>
+              <a:t>Adding absorbers to the model</a:t>
             </a:r>
             <a:endParaRPr lang="en-GB" dirty="0"/>
           </a:p>
@@ -3733,12 +3893,12 @@
       </p:sp>
       <p:sp>
         <p:nvSpPr>
-          <p:cNvPr id="5" name="Content Placeholder 4"/>
-          <p:cNvSpPr>
-            <a:spLocks noGrp="1"/>
-          </p:cNvSpPr>
-          <p:nvPr>
-            <p:ph idx="1"/>
+          <p:cNvPr id="5" name="Text Placeholder 4"/>
+          <p:cNvSpPr>
+            <a:spLocks noGrp="1"/>
+          </p:cNvSpPr>
+          <p:nvPr>
+            <p:ph type="body" idx="1"/>
           </p:nvPr>
         </p:nvSpPr>
         <p:spPr/>
@@ -3746,50 +3906,7 @@
           <a:bodyPr/>
           <a:lstStyle/>
           <a:p>
-            <a:r>
-              <a:rPr lang="en-GB" dirty="0" smtClean="0"/>
-              <a:t>Absorbers needs a </a:t>
-            </a:r>
-            <a:r>
-              <a:rPr lang="en-GB" i="1" dirty="0" smtClean="0"/>
-              <a:t>damped </a:t>
-            </a:r>
-            <a:r>
-              <a:rPr lang="en-GB" dirty="0" smtClean="0"/>
-              <a:t>frequency matching the frequency of the peak to eliminate</a:t>
-            </a:r>
-          </a:p>
-          <a:p>
-            <a:r>
-              <a:rPr lang="en-GB" dirty="0" smtClean="0"/>
-              <a:t>Can be derived from </a:t>
-            </a:r>
-            <a:r>
-              <a:rPr lang="en-GB" dirty="0" err="1" smtClean="0"/>
-              <a:t>databook</a:t>
-            </a:r>
-            <a:r>
-              <a:rPr lang="en-GB" dirty="0" smtClean="0"/>
-              <a:t> equations</a:t>
-            </a:r>
-          </a:p>
-          <a:p>
-            <a:r>
-              <a:rPr lang="en-GB" dirty="0" smtClean="0"/>
-              <a:t>[equation]</a:t>
-            </a:r>
-          </a:p>
-          <a:p>
-            <a:r>
-              <a:rPr lang="en-GB" dirty="0" smtClean="0"/>
-              <a:t>For simplicity, assume absorber damping equal to building damping</a:t>
-            </a:r>
-          </a:p>
-          <a:p>
-            <a:pPr>
-              <a:buNone/>
-            </a:pPr>
-            <a:endParaRPr lang="en-GB" dirty="0"/>
+            <a:endParaRPr lang="en-GB"/>
           </a:p>
         </p:txBody>
       </p:sp>
@@ -3798,6 +3915,13 @@
   <p:clrMapOvr>
     <a:masterClrMapping/>
   </p:clrMapOvr>
+  <p:timing>
+    <p:tnLst>
+      <p:par>
+        <p:cTn id="1" dur="indefinite" restart="never" nodeType="tmRoot"/>
+      </p:par>
+    </p:tnLst>
+  </p:timing>
 </p:sld>
 </file>
 
@@ -3864,8 +3988,13 @@
           <a:p>
             <a:r>
               <a:rPr lang="en-GB" dirty="0" smtClean="0"/>
-              <a:t>Conserve total mass of absorbers</a:t>
-            </a:r>
+              <a:t>Conserve total mass of </a:t>
+            </a:r>
+            <a:r>
+              <a:rPr lang="en-GB" dirty="0" smtClean="0"/>
+              <a:t>absorbers</a:t>
+            </a:r>
+            <a:endParaRPr lang="en-GB" dirty="0" smtClean="0"/>
           </a:p>
           <a:p>
             <a:r>
@@ -3881,6 +4010,13 @@
   <p:clrMapOvr>
     <a:masterClrMapping/>
   </p:clrMapOvr>
+  <p:timing>
+    <p:tnLst>
+      <p:par>
+        <p:cTn id="1" dur="indefinite" restart="never" nodeType="tmRoot"/>
+      </p:par>
+    </p:tnLst>
+  </p:timing>
 </p:sld>
 </file>
 
@@ -3918,40 +4054,142 @@
           <a:p>
             <a:r>
               <a:rPr lang="en-GB" dirty="0" smtClean="0"/>
-              <a:t>Effect of adding absorbers</a:t>
+              <a:t>Effect of adding </a:t>
+            </a:r>
+            <a:r>
+              <a:rPr lang="en-GB" dirty="0" smtClean="0"/>
+              <a:t>absorbers (video)</a:t>
             </a:r>
             <a:endParaRPr lang="en-GB" dirty="0"/>
           </a:p>
         </p:txBody>
       </p:sp>
-      <p:sp>
-        <p:nvSpPr>
-          <p:cNvPr id="3" name="Content Placeholder 2"/>
-          <p:cNvSpPr>
-            <a:spLocks noGrp="1"/>
-          </p:cNvSpPr>
+      <p:pic>
+        <p:nvPicPr>
+          <p:cNvPr id="10" name="video.avi">
+            <a:hlinkClick r:id="" action="ppaction://media"/>
+          </p:cNvPr>
+          <p:cNvPicPr>
+            <a:picLocks noGrp="1" noRot="1" noChangeAspect="1"/>
+          </p:cNvPicPr>
           <p:nvPr>
             <p:ph idx="1"/>
-          </p:nvPr>
-        </p:nvSpPr>
-        <p:spPr/>
-        <p:txBody>
-          <a:bodyPr/>
-          <a:lstStyle/>
-          <a:p>
-            <a:r>
-              <a:rPr lang="en-GB" dirty="0" smtClean="0"/>
-              <a:t>[graph/animation]</a:t>
-            </a:r>
-            <a:endParaRPr lang="en-GB" dirty="0"/>
-          </a:p>
-        </p:txBody>
-      </p:sp>
+            <a:videoFile r:link="rId1"/>
+          </p:nvPr>
+        </p:nvPicPr>
+        <p:blipFill>
+          <a:blip r:embed="rId3" cstate="print"/>
+          <a:stretch>
+            <a:fillRect/>
+          </a:stretch>
+        </p:blipFill>
+        <p:spPr>
+          <a:xfrm>
+            <a:off x="1524000" y="1576388"/>
+            <a:ext cx="6096000" cy="4572000"/>
+          </a:xfrm>
+          <a:prstGeom prst="rect">
+            <a:avLst/>
+          </a:prstGeom>
+        </p:spPr>
+      </p:pic>
     </p:spTree>
   </p:cSld>
   <p:clrMapOvr>
     <a:masterClrMapping/>
   </p:clrMapOvr>
+  <p:timing>
+    <p:tnLst>
+      <p:par>
+        <p:cTn id="1" dur="indefinite" restart="never" nodeType="tmRoot">
+          <p:childTnLst>
+            <p:seq concurrent="1" nextAc="seek">
+              <p:cTn id="2" restart="whenNotActive" fill="hold" evtFilter="cancelBubble" nodeType="interactiveSeq">
+                <p:stCondLst>
+                  <p:cond evt="onClick" delay="0">
+                    <p:tgtEl>
+                      <p:spTgt spid="10"/>
+                    </p:tgtEl>
+                  </p:cond>
+                </p:stCondLst>
+                <p:endSync evt="end" delay="0">
+                  <p:rtn val="all"/>
+                </p:endSync>
+                <p:childTnLst>
+                  <p:par>
+                    <p:cTn id="3" fill="hold">
+                      <p:stCondLst>
+                        <p:cond delay="0"/>
+                      </p:stCondLst>
+                      <p:childTnLst>
+                        <p:par>
+                          <p:cTn id="4" fill="hold">
+                            <p:stCondLst>
+                              <p:cond delay="0"/>
+                            </p:stCondLst>
+                            <p:childTnLst>
+                              <p:par>
+                                <p:cTn id="5" presetID="2" presetClass="mediacall" presetSubtype="0" fill="hold" nodeType="clickEffect">
+                                  <p:stCondLst>
+                                    <p:cond delay="0"/>
+                                  </p:stCondLst>
+                                  <p:childTnLst>
+                                    <p:cmd type="call" cmd="togglePause">
+                                      <p:cBhvr>
+                                        <p:cTn id="6" dur="1" fill="hold"/>
+                                        <p:tgtEl>
+                                          <p:spTgt spid="10"/>
+                                        </p:tgtEl>
+                                      </p:cBhvr>
+                                    </p:cmd>
+                                  </p:childTnLst>
+                                </p:cTn>
+                              </p:par>
+                            </p:childTnLst>
+                          </p:cTn>
+                        </p:par>
+                      </p:childTnLst>
+                    </p:cTn>
+                  </p:par>
+                </p:childTnLst>
+              </p:cTn>
+              <p:nextCondLst>
+                <p:cond evt="onClick" delay="0">
+                  <p:tgtEl>
+                    <p:spTgt spid="10"/>
+                  </p:tgtEl>
+                </p:cond>
+              </p:nextCondLst>
+            </p:seq>
+            <p:video>
+              <p:cMediaNode>
+                <p:cTn id="7" fill="hold" display="0">
+                  <p:stCondLst>
+                    <p:cond delay="indefinite"/>
+                  </p:stCondLst>
+                  <p:endCondLst>
+                    <p:cond evt="onNext" delay="0">
+                      <p:tgtEl>
+                        <p:sldTgt/>
+                      </p:tgtEl>
+                    </p:cond>
+                    <p:cond evt="onPrev" delay="0">
+                      <p:tgtEl>
+                        <p:sldTgt/>
+                      </p:tgtEl>
+                    </p:cond>
+                  </p:endCondLst>
+                </p:cTn>
+                <p:tgtEl>
+                  <p:spTgt spid="10"/>
+                </p:tgtEl>
+              </p:cMediaNode>
+            </p:video>
+          </p:childTnLst>
+        </p:cTn>
+      </p:par>
+    </p:tnLst>
+  </p:timing>
 </p:sld>
 </file>
 
@@ -3995,47 +4233,41 @@
           </a:p>
         </p:txBody>
       </p:sp>
-      <p:sp>
-        <p:nvSpPr>
-          <p:cNvPr id="3" name="Content Placeholder 2"/>
-          <p:cNvSpPr>
-            <a:spLocks noGrp="1"/>
-          </p:cNvSpPr>
+      <p:pic>
+        <p:nvPicPr>
+          <p:cNvPr id="4" name="Content Placeholder 3" descr="absorber-04.png"/>
+          <p:cNvPicPr>
+            <a:picLocks noGrp="1" noChangeAspect="1"/>
+          </p:cNvPicPr>
           <p:nvPr>
             <p:ph idx="1"/>
           </p:nvPr>
-        </p:nvSpPr>
-        <p:spPr/>
-        <p:txBody>
-          <a:bodyPr/>
-          <a:lstStyle/>
-          <a:p>
-            <a:r>
-              <a:rPr lang="en-GB" dirty="0" smtClean="0"/>
-              <a:t>[histogram of absorber frequency by mass]</a:t>
-            </a:r>
-          </a:p>
-          <a:p>
-            <a:r>
-              <a:rPr lang="en-GB" dirty="0" smtClean="0"/>
-              <a:t>[max amplitude (by floor) against </a:t>
-            </a:r>
-            <a:r>
-              <a:rPr lang="en-GB" dirty="0" err="1" smtClean="0"/>
-              <a:t>n_abs</a:t>
-            </a:r>
-            <a:r>
-              <a:rPr lang="en-GB" dirty="0"/>
-              <a:t>]</a:t>
-            </a:r>
-          </a:p>
-        </p:txBody>
-      </p:sp>
+        </p:nvPicPr>
+        <p:blipFill>
+          <a:blip r:embed="rId2" cstate="print"/>
+          <a:stretch>
+            <a:fillRect/>
+          </a:stretch>
+        </p:blipFill>
+        <p:spPr>
+          <a:xfrm>
+            <a:off x="1554691" y="1600200"/>
+            <a:ext cx="6034618" cy="4525963"/>
+          </a:xfrm>
+        </p:spPr>
+      </p:pic>
     </p:spTree>
   </p:cSld>
   <p:clrMapOvr>
     <a:masterClrMapping/>
   </p:clrMapOvr>
+  <p:timing>
+    <p:tnLst>
+      <p:par>
+        <p:cTn id="1" dur="indefinite" restart="never" nodeType="tmRoot"/>
+      </p:par>
+    </p:tnLst>
+  </p:timing>
 </p:sld>
 </file>
 
@@ -4058,7 +4290,7 @@
       </p:grpSpPr>
       <p:sp>
         <p:nvSpPr>
-          <p:cNvPr id="6" name="Title 5"/>
+          <p:cNvPr id="2" name="Title 1"/>
           <p:cNvSpPr>
             <a:spLocks noGrp="1"/>
           </p:cNvSpPr>
@@ -4073,36 +4305,47 @@
           <a:p>
             <a:r>
               <a:rPr lang="en-GB" dirty="0" smtClean="0"/>
-              <a:t>Applying a “real” earthquake</a:t>
+              <a:t>Effect of adding absorbers</a:t>
             </a:r>
             <a:endParaRPr lang="en-GB" dirty="0"/>
           </a:p>
         </p:txBody>
       </p:sp>
-      <p:sp>
-        <p:nvSpPr>
-          <p:cNvPr id="7" name="Text Placeholder 6"/>
-          <p:cNvSpPr>
-            <a:spLocks noGrp="1"/>
-          </p:cNvSpPr>
-          <p:nvPr>
-            <p:ph type="body" idx="1"/>
-          </p:nvPr>
-        </p:nvSpPr>
-        <p:spPr/>
-        <p:txBody>
-          <a:bodyPr/>
-          <a:lstStyle/>
-          <a:p>
-            <a:endParaRPr lang="en-GB"/>
-          </a:p>
-        </p:txBody>
-      </p:sp>
+      <p:pic>
+        <p:nvPicPr>
+          <p:cNvPr id="4" name="Content Placeholder 3" descr="absorber-05.png"/>
+          <p:cNvPicPr>
+            <a:picLocks noGrp="1" noChangeAspect="1"/>
+          </p:cNvPicPr>
+          <p:nvPr>
+            <p:ph idx="1"/>
+          </p:nvPr>
+        </p:nvPicPr>
+        <p:blipFill>
+          <a:blip r:embed="rId2" cstate="print"/>
+          <a:stretch>
+            <a:fillRect/>
+          </a:stretch>
+        </p:blipFill>
+        <p:spPr>
+          <a:xfrm>
+            <a:off x="1554691" y="1600200"/>
+            <a:ext cx="6034618" cy="4525963"/>
+          </a:xfrm>
+        </p:spPr>
+      </p:pic>
     </p:spTree>
   </p:cSld>
   <p:clrMapOvr>
     <a:masterClrMapping/>
   </p:clrMapOvr>
+  <p:timing>
+    <p:tnLst>
+      <p:par>
+        <p:cTn id="1" dur="indefinite" restart="never" nodeType="tmRoot"/>
+      </p:par>
+    </p:tnLst>
+  </p:timing>
 </p:sld>
 </file>
 
@@ -4125,7 +4368,7 @@
       </p:grpSpPr>
       <p:sp>
         <p:nvSpPr>
-          <p:cNvPr id="4" name="Title 3"/>
+          <p:cNvPr id="2" name="Title 1"/>
           <p:cNvSpPr>
             <a:spLocks noGrp="1"/>
           </p:cNvSpPr>
@@ -4140,36 +4383,47 @@
           <a:p>
             <a:r>
               <a:rPr lang="en-GB" dirty="0" smtClean="0"/>
-              <a:t>Displacement / time graph</a:t>
+              <a:t>Effect of adding absorbers</a:t>
             </a:r>
             <a:endParaRPr lang="en-GB" dirty="0"/>
           </a:p>
         </p:txBody>
       </p:sp>
-      <p:sp>
-        <p:nvSpPr>
-          <p:cNvPr id="5" name="Content Placeholder 4"/>
-          <p:cNvSpPr>
-            <a:spLocks noGrp="1"/>
-          </p:cNvSpPr>
+      <p:pic>
+        <p:nvPicPr>
+          <p:cNvPr id="7" name="Content Placeholder 6" descr="absorber-06.png"/>
+          <p:cNvPicPr>
+            <a:picLocks noGrp="1" noChangeAspect="1"/>
+          </p:cNvPicPr>
           <p:nvPr>
             <p:ph idx="1"/>
           </p:nvPr>
-        </p:nvSpPr>
-        <p:spPr/>
-        <p:txBody>
-          <a:bodyPr/>
-          <a:lstStyle/>
-          <a:p>
-            <a:endParaRPr lang="en-GB"/>
-          </a:p>
-        </p:txBody>
-      </p:sp>
+        </p:nvPicPr>
+        <p:blipFill>
+          <a:blip r:embed="rId2" cstate="print"/>
+          <a:stretch>
+            <a:fillRect/>
+          </a:stretch>
+        </p:blipFill>
+        <p:spPr>
+          <a:xfrm>
+            <a:off x="1554691" y="1600200"/>
+            <a:ext cx="6034618" cy="4525963"/>
+          </a:xfrm>
+        </p:spPr>
+      </p:pic>
     </p:spTree>
   </p:cSld>
   <p:clrMapOvr>
     <a:masterClrMapping/>
   </p:clrMapOvr>
+  <p:timing>
+    <p:tnLst>
+      <p:par>
+        <p:cTn id="1" dur="indefinite" restart="never" nodeType="tmRoot"/>
+      </p:par>
+    </p:tnLst>
+  </p:timing>
 </p:sld>
 </file>
 
@@ -4207,74 +4461,126 @@
           <a:p>
             <a:r>
               <a:rPr lang="en-GB" dirty="0" smtClean="0"/>
-              <a:t>Tuning for earthquakes</a:t>
+              <a:t>Effect of adding absorbers</a:t>
             </a:r>
             <a:endParaRPr lang="en-GB" dirty="0"/>
           </a:p>
         </p:txBody>
       </p:sp>
-      <p:sp>
-        <p:nvSpPr>
-          <p:cNvPr id="3" name="Content Placeholder 2"/>
-          <p:cNvSpPr>
-            <a:spLocks noGrp="1"/>
-          </p:cNvSpPr>
+      <p:pic>
+        <p:nvPicPr>
+          <p:cNvPr id="5123" name="Picture 3" descr="C:\Users\Home\Documents\docs\stuff from uni\year 2 cambridge\cued-icw\graphs - Copy\amp-vs-no-abs.png"/>
+          <p:cNvPicPr>
+            <a:picLocks noGrp="1" noChangeAspect="1" noChangeArrowheads="1"/>
+          </p:cNvPicPr>
           <p:nvPr>
             <p:ph idx="1"/>
           </p:nvPr>
-        </p:nvSpPr>
-        <p:spPr/>
-        <p:txBody>
-          <a:bodyPr/>
-          <a:lstStyle/>
-          <a:p>
-            <a:r>
-              <a:rPr lang="en-GB" dirty="0" smtClean="0"/>
-              <a:t>Multiply FFT of earthquake by freq response when tuning</a:t>
-            </a:r>
-          </a:p>
-          <a:p>
-            <a:r>
-              <a:rPr lang="en-GB" dirty="0" smtClean="0"/>
-              <a:t>Result:</a:t>
-            </a:r>
-          </a:p>
-          <a:p>
-            <a:r>
-              <a:rPr lang="en-GB" dirty="0" smtClean="0"/>
-              <a:t>[graph of displacement before </a:t>
-            </a:r>
-            <a:r>
-              <a:rPr lang="en-GB" dirty="0" err="1" smtClean="0"/>
-              <a:t>vs</a:t>
-            </a:r>
-            <a:r>
-              <a:rPr lang="en-GB" dirty="0" smtClean="0"/>
-              <a:t> after]</a:t>
-            </a:r>
-          </a:p>
-          <a:p>
-            <a:r>
-              <a:rPr lang="en-GB" dirty="0" smtClean="0"/>
-              <a:t>[ </a:t>
-            </a:r>
-            <a:r>
-              <a:rPr lang="en-GB" smtClean="0"/>
-              <a:t>dfft</a:t>
-            </a:r>
-            <a:r>
-              <a:rPr lang="en-GB" dirty="0" smtClean="0"/>
-              <a:t> before after?]</a:t>
-            </a:r>
-            <a:endParaRPr lang="en-GB" dirty="0"/>
-          </a:p>
-        </p:txBody>
-      </p:sp>
+        </p:nvPicPr>
+        <p:blipFill>
+          <a:blip r:embed="rId2" cstate="print"/>
+          <a:srcRect/>
+          <a:stretch>
+            <a:fillRect/>
+          </a:stretch>
+        </p:blipFill>
+        <p:spPr bwMode="auto">
+          <a:xfrm>
+            <a:off x="1554691" y="1600200"/>
+            <a:ext cx="6034618" cy="4525963"/>
+          </a:xfrm>
+          <a:prstGeom prst="rect">
+            <a:avLst/>
+          </a:prstGeom>
+          <a:noFill/>
+        </p:spPr>
+      </p:pic>
     </p:spTree>
   </p:cSld>
   <p:clrMapOvr>
     <a:masterClrMapping/>
   </p:clrMapOvr>
+  <p:timing>
+    <p:tnLst>
+      <p:par>
+        <p:cTn id="1" dur="indefinite" restart="never" nodeType="tmRoot"/>
+      </p:par>
+    </p:tnLst>
+  </p:timing>
+</p:sld>
+</file>
+
+<file path=ppt/slides/slide19.xml><?xml version="1.0" encoding="utf-8"?>
+<p:sld xmlns:a="http://schemas.openxmlformats.org/drawingml/2006/main" xmlns:r="http://schemas.openxmlformats.org/officeDocument/2006/relationships" xmlns:p="http://schemas.openxmlformats.org/presentationml/2006/main">
+  <p:cSld>
+    <p:spTree>
+      <p:nvGrpSpPr>
+        <p:cNvPr id="1" name=""/>
+        <p:cNvGrpSpPr/>
+        <p:nvPr/>
+      </p:nvGrpSpPr>
+      <p:grpSpPr>
+        <a:xfrm>
+          <a:off x="0" y="0"/>
+          <a:ext cx="0" cy="0"/>
+          <a:chOff x="0" y="0"/>
+          <a:chExt cx="0" cy="0"/>
+        </a:xfrm>
+      </p:grpSpPr>
+      <p:sp>
+        <p:nvSpPr>
+          <p:cNvPr id="6" name="Title 5"/>
+          <p:cNvSpPr>
+            <a:spLocks noGrp="1"/>
+          </p:cNvSpPr>
+          <p:nvPr>
+            <p:ph type="title"/>
+          </p:nvPr>
+        </p:nvSpPr>
+        <p:spPr/>
+        <p:txBody>
+          <a:bodyPr/>
+          <a:lstStyle/>
+          <a:p>
+            <a:r>
+              <a:rPr lang="en-GB" dirty="0" smtClean="0"/>
+              <a:t>Applying stimuli</a:t>
+            </a:r>
+            <a:endParaRPr lang="en-GB" dirty="0"/>
+          </a:p>
+        </p:txBody>
+      </p:sp>
+      <p:sp>
+        <p:nvSpPr>
+          <p:cNvPr id="7" name="Text Placeholder 6"/>
+          <p:cNvSpPr>
+            <a:spLocks noGrp="1"/>
+          </p:cNvSpPr>
+          <p:nvPr>
+            <p:ph type="body" idx="1"/>
+          </p:nvPr>
+        </p:nvSpPr>
+        <p:spPr/>
+        <p:txBody>
+          <a:bodyPr/>
+          <a:lstStyle/>
+          <a:p>
+            <a:endParaRPr lang="en-GB"/>
+          </a:p>
+        </p:txBody>
+      </p:sp>
+    </p:spTree>
+  </p:cSld>
+  <p:clrMapOvr>
+    <a:masterClrMapping/>
+  </p:clrMapOvr>
+  <p:timing>
+    <p:tnLst>
+      <p:par>
+        <p:cTn id="1" dur="indefinite" restart="never" nodeType="tmRoot"/>
+      </p:par>
+    </p:tnLst>
+  </p:timing>
 </p:sld>
 </file>
 
@@ -4334,6 +4640,461 @@
           <a:lstStyle/>
           <a:p>
             <a:endParaRPr lang="en-GB"/>
+          </a:p>
+        </p:txBody>
+      </p:sp>
+    </p:spTree>
+  </p:cSld>
+  <p:clrMapOvr>
+    <a:masterClrMapping/>
+  </p:clrMapOvr>
+  <p:timing>
+    <p:tnLst>
+      <p:par>
+        <p:cTn id="1" dur="indefinite" restart="never" nodeType="tmRoot"/>
+      </p:par>
+    </p:tnLst>
+  </p:timing>
+</p:sld>
+</file>
+
+<file path=ppt/slides/slide20.xml><?xml version="1.0" encoding="utf-8"?>
+<p:sld xmlns:a="http://schemas.openxmlformats.org/drawingml/2006/main" xmlns:r="http://schemas.openxmlformats.org/officeDocument/2006/relationships" xmlns:p="http://schemas.openxmlformats.org/presentationml/2006/main">
+  <p:cSld>
+    <p:spTree>
+      <p:nvGrpSpPr>
+        <p:cNvPr id="1" name=""/>
+        <p:cNvGrpSpPr/>
+        <p:nvPr/>
+      </p:nvGrpSpPr>
+      <p:grpSpPr>
+        <a:xfrm>
+          <a:off x="0" y="0"/>
+          <a:ext cx="0" cy="0"/>
+          <a:chOff x="0" y="0"/>
+          <a:chExt cx="0" cy="0"/>
+        </a:xfrm>
+      </p:grpSpPr>
+      <p:sp>
+        <p:nvSpPr>
+          <p:cNvPr id="4" name="Title 3"/>
+          <p:cNvSpPr>
+            <a:spLocks noGrp="1"/>
+          </p:cNvSpPr>
+          <p:nvPr>
+            <p:ph type="title"/>
+          </p:nvPr>
+        </p:nvSpPr>
+        <p:spPr/>
+        <p:txBody>
+          <a:bodyPr/>
+          <a:lstStyle/>
+          <a:p>
+            <a:r>
+              <a:rPr lang="en-GB" dirty="0" smtClean="0"/>
+              <a:t>Response to step input</a:t>
+            </a:r>
+            <a:endParaRPr lang="en-GB" dirty="0"/>
+          </a:p>
+        </p:txBody>
+      </p:sp>
+      <p:pic>
+        <p:nvPicPr>
+          <p:cNvPr id="20" name="Picture 4" descr="C:\Users\Home\Documents\docs\stuff from uni\year 2 cambridge\cued-icw\graphs\step-disp.png"/>
+          <p:cNvPicPr>
+            <a:picLocks noGrp="1" noChangeAspect="1" noChangeArrowheads="1"/>
+          </p:cNvPicPr>
+          <p:nvPr>
+            <p:ph idx="1"/>
+          </p:nvPr>
+        </p:nvPicPr>
+        <p:blipFill>
+          <a:blip r:embed="rId2" cstate="print"/>
+          <a:srcRect/>
+          <a:stretch>
+            <a:fillRect/>
+          </a:stretch>
+        </p:blipFill>
+        <p:spPr bwMode="auto">
+          <a:xfrm>
+            <a:off x="1554691" y="1600200"/>
+            <a:ext cx="6034618" cy="4525963"/>
+          </a:xfrm>
+          <a:prstGeom prst="rect">
+            <a:avLst/>
+          </a:prstGeom>
+          <a:noFill/>
+        </p:spPr>
+      </p:pic>
+    </p:spTree>
+  </p:cSld>
+  <p:clrMapOvr>
+    <a:masterClrMapping/>
+  </p:clrMapOvr>
+  <p:timing>
+    <p:tnLst>
+      <p:par>
+        <p:cTn id="1" dur="indefinite" restart="never" nodeType="tmRoot"/>
+      </p:par>
+    </p:tnLst>
+  </p:timing>
+</p:sld>
+</file>
+
+<file path=ppt/slides/slide21.xml><?xml version="1.0" encoding="utf-8"?>
+<p:sld xmlns:a="http://schemas.openxmlformats.org/drawingml/2006/main" xmlns:r="http://schemas.openxmlformats.org/officeDocument/2006/relationships" xmlns:p="http://schemas.openxmlformats.org/presentationml/2006/main">
+  <p:cSld>
+    <p:spTree>
+      <p:nvGrpSpPr>
+        <p:cNvPr id="1" name=""/>
+        <p:cNvGrpSpPr/>
+        <p:nvPr/>
+      </p:nvGrpSpPr>
+      <p:grpSpPr>
+        <a:xfrm>
+          <a:off x="0" y="0"/>
+          <a:ext cx="0" cy="0"/>
+          <a:chOff x="0" y="0"/>
+          <a:chExt cx="0" cy="0"/>
+        </a:xfrm>
+      </p:grpSpPr>
+      <p:sp>
+        <p:nvSpPr>
+          <p:cNvPr id="4" name="Title 3"/>
+          <p:cNvSpPr>
+            <a:spLocks noGrp="1"/>
+          </p:cNvSpPr>
+          <p:nvPr>
+            <p:ph type="title"/>
+          </p:nvPr>
+        </p:nvSpPr>
+        <p:spPr/>
+        <p:txBody>
+          <a:bodyPr/>
+          <a:lstStyle/>
+          <a:p>
+            <a:r>
+              <a:rPr lang="en-GB" dirty="0" smtClean="0"/>
+              <a:t>Response to frequency sweep</a:t>
+            </a:r>
+            <a:endParaRPr lang="en-GB" dirty="0"/>
+          </a:p>
+        </p:txBody>
+      </p:sp>
+      <p:pic>
+        <p:nvPicPr>
+          <p:cNvPr id="8" name="Picture 3" descr="C:\Users\Home\Documents\docs\stuff from uni\year 2 cambridge\cued-icw\graphs\sweep-disp.png"/>
+          <p:cNvPicPr>
+            <a:picLocks noGrp="1" noChangeAspect="1" noChangeArrowheads="1"/>
+          </p:cNvPicPr>
+          <p:nvPr>
+            <p:ph idx="1"/>
+          </p:nvPr>
+        </p:nvPicPr>
+        <p:blipFill>
+          <a:blip r:embed="rId2" cstate="print"/>
+          <a:srcRect/>
+          <a:stretch>
+            <a:fillRect/>
+          </a:stretch>
+        </p:blipFill>
+        <p:spPr bwMode="auto">
+          <a:xfrm>
+            <a:off x="1554691" y="1600200"/>
+            <a:ext cx="6034618" cy="4525963"/>
+          </a:xfrm>
+          <a:prstGeom prst="rect">
+            <a:avLst/>
+          </a:prstGeom>
+          <a:noFill/>
+        </p:spPr>
+      </p:pic>
+    </p:spTree>
+  </p:cSld>
+  <p:clrMapOvr>
+    <a:masterClrMapping/>
+  </p:clrMapOvr>
+  <p:timing>
+    <p:tnLst>
+      <p:par>
+        <p:cTn id="1" dur="indefinite" restart="never" nodeType="tmRoot"/>
+      </p:par>
+    </p:tnLst>
+  </p:timing>
+</p:sld>
+</file>
+
+<file path=ppt/slides/slide22.xml><?xml version="1.0" encoding="utf-8"?>
+<p:sld xmlns:a="http://schemas.openxmlformats.org/drawingml/2006/main" xmlns:r="http://schemas.openxmlformats.org/officeDocument/2006/relationships" xmlns:p="http://schemas.openxmlformats.org/presentationml/2006/main">
+  <p:cSld>
+    <p:spTree>
+      <p:nvGrpSpPr>
+        <p:cNvPr id="1" name=""/>
+        <p:cNvGrpSpPr/>
+        <p:nvPr/>
+      </p:nvGrpSpPr>
+      <p:grpSpPr>
+        <a:xfrm>
+          <a:off x="0" y="0"/>
+          <a:ext cx="0" cy="0"/>
+          <a:chOff x="0" y="0"/>
+          <a:chExt cx="0" cy="0"/>
+        </a:xfrm>
+      </p:grpSpPr>
+      <p:sp>
+        <p:nvSpPr>
+          <p:cNvPr id="4" name="Title 3"/>
+          <p:cNvSpPr>
+            <a:spLocks noGrp="1"/>
+          </p:cNvSpPr>
+          <p:nvPr>
+            <p:ph type="title"/>
+          </p:nvPr>
+        </p:nvSpPr>
+        <p:spPr/>
+        <p:txBody>
+          <a:bodyPr/>
+          <a:lstStyle/>
+          <a:p>
+            <a:r>
+              <a:rPr lang="en-GB" dirty="0" smtClean="0"/>
+              <a:t>Response to earthquake</a:t>
+            </a:r>
+            <a:endParaRPr lang="en-GB" dirty="0"/>
+          </a:p>
+        </p:txBody>
+      </p:sp>
+      <p:pic>
+        <p:nvPicPr>
+          <p:cNvPr id="10" name="Picture 5" descr="C:\Users\Home\Documents\docs\stuff from uni\year 2 cambridge\cued-icw\graphs\eq-disp.png"/>
+          <p:cNvPicPr>
+            <a:picLocks noGrp="1" noChangeAspect="1" noChangeArrowheads="1"/>
+          </p:cNvPicPr>
+          <p:nvPr>
+            <p:ph idx="1"/>
+          </p:nvPr>
+        </p:nvPicPr>
+        <p:blipFill>
+          <a:blip r:embed="rId2" cstate="print"/>
+          <a:srcRect/>
+          <a:stretch>
+            <a:fillRect/>
+          </a:stretch>
+        </p:blipFill>
+        <p:spPr bwMode="auto">
+          <a:xfrm>
+            <a:off x="1554691" y="1600200"/>
+            <a:ext cx="6034618" cy="4525963"/>
+          </a:xfrm>
+          <a:prstGeom prst="rect">
+            <a:avLst/>
+          </a:prstGeom>
+          <a:noFill/>
+        </p:spPr>
+      </p:pic>
+    </p:spTree>
+  </p:cSld>
+  <p:clrMapOvr>
+    <a:masterClrMapping/>
+  </p:clrMapOvr>
+  <p:timing>
+    <p:tnLst>
+      <p:par>
+        <p:cTn id="1" dur="indefinite" restart="never" nodeType="tmRoot"/>
+      </p:par>
+    </p:tnLst>
+  </p:timing>
+</p:sld>
+</file>
+
+<file path=ppt/slides/slide23.xml><?xml version="1.0" encoding="utf-8"?>
+<p:sld xmlns:a="http://schemas.openxmlformats.org/drawingml/2006/main" xmlns:r="http://schemas.openxmlformats.org/officeDocument/2006/relationships" xmlns:p="http://schemas.openxmlformats.org/presentationml/2006/main">
+  <p:cSld>
+    <p:spTree>
+      <p:nvGrpSpPr>
+        <p:cNvPr id="1" name=""/>
+        <p:cNvGrpSpPr/>
+        <p:nvPr/>
+      </p:nvGrpSpPr>
+      <p:grpSpPr>
+        <a:xfrm>
+          <a:off x="0" y="0"/>
+          <a:ext cx="0" cy="0"/>
+          <a:chOff x="0" y="0"/>
+          <a:chExt cx="0" cy="0"/>
+        </a:xfrm>
+      </p:grpSpPr>
+      <p:sp>
+        <p:nvSpPr>
+          <p:cNvPr id="2" name="Title 1"/>
+          <p:cNvSpPr>
+            <a:spLocks noGrp="1"/>
+          </p:cNvSpPr>
+          <p:nvPr>
+            <p:ph type="title"/>
+          </p:nvPr>
+        </p:nvSpPr>
+        <p:spPr/>
+        <p:txBody>
+          <a:bodyPr/>
+          <a:lstStyle/>
+          <a:p>
+            <a:r>
+              <a:rPr lang="en-GB" dirty="0" smtClean="0"/>
+              <a:t>Tuning for earthquakes</a:t>
+            </a:r>
+            <a:endParaRPr lang="en-GB" dirty="0"/>
+          </a:p>
+        </p:txBody>
+      </p:sp>
+      <p:pic>
+        <p:nvPicPr>
+          <p:cNvPr id="3074" name="Picture 2" descr="C:\Users\Home\Documents\docs\stuff from uni\year 2 cambridge\cued-icw\graphs\fft-eq.png"/>
+          <p:cNvPicPr>
+            <a:picLocks noGrp="1" noChangeAspect="1" noChangeArrowheads="1"/>
+          </p:cNvPicPr>
+          <p:nvPr>
+            <p:ph idx="1"/>
+          </p:nvPr>
+        </p:nvPicPr>
+        <p:blipFill>
+          <a:blip r:embed="rId2" cstate="print"/>
+          <a:srcRect/>
+          <a:stretch>
+            <a:fillRect/>
+          </a:stretch>
+        </p:blipFill>
+        <p:spPr bwMode="auto">
+          <a:xfrm>
+            <a:off x="1554691" y="1600200"/>
+            <a:ext cx="6034618" cy="4525963"/>
+          </a:xfrm>
+          <a:prstGeom prst="rect">
+            <a:avLst/>
+          </a:prstGeom>
+          <a:noFill/>
+        </p:spPr>
+      </p:pic>
+    </p:spTree>
+  </p:cSld>
+  <p:clrMapOvr>
+    <a:masterClrMapping/>
+  </p:clrMapOvr>
+  <p:timing>
+    <p:tnLst>
+      <p:par>
+        <p:cTn id="1" dur="indefinite" restart="never" nodeType="tmRoot"/>
+      </p:par>
+    </p:tnLst>
+  </p:timing>
+</p:sld>
+</file>
+
+<file path=ppt/slides/slide24.xml><?xml version="1.0" encoding="utf-8"?>
+<p:sld xmlns:a="http://schemas.openxmlformats.org/drawingml/2006/main" xmlns:r="http://schemas.openxmlformats.org/officeDocument/2006/relationships" xmlns:p="http://schemas.openxmlformats.org/presentationml/2006/main">
+  <p:cSld>
+    <p:spTree>
+      <p:nvGrpSpPr>
+        <p:cNvPr id="1" name=""/>
+        <p:cNvGrpSpPr/>
+        <p:nvPr/>
+      </p:nvGrpSpPr>
+      <p:grpSpPr>
+        <a:xfrm>
+          <a:off x="0" y="0"/>
+          <a:ext cx="0" cy="0"/>
+          <a:chOff x="0" y="0"/>
+          <a:chExt cx="0" cy="0"/>
+        </a:xfrm>
+      </p:grpSpPr>
+      <p:sp>
+        <p:nvSpPr>
+          <p:cNvPr id="4" name="Title 3"/>
+          <p:cNvSpPr>
+            <a:spLocks noGrp="1"/>
+          </p:cNvSpPr>
+          <p:nvPr>
+            <p:ph type="title"/>
+          </p:nvPr>
+        </p:nvSpPr>
+        <p:spPr/>
+        <p:txBody>
+          <a:bodyPr/>
+          <a:lstStyle/>
+          <a:p>
+            <a:r>
+              <a:rPr lang="en-GB" dirty="0" smtClean="0"/>
+              <a:t>Damping resonant peaks</a:t>
+            </a:r>
+            <a:endParaRPr lang="en-GB" dirty="0"/>
+          </a:p>
+        </p:txBody>
+      </p:sp>
+      <p:sp>
+        <p:nvSpPr>
+          <p:cNvPr id="5" name="Content Placeholder 4"/>
+          <p:cNvSpPr>
+            <a:spLocks noGrp="1"/>
+          </p:cNvSpPr>
+          <p:nvPr>
+            <p:ph idx="1"/>
+          </p:nvPr>
+        </p:nvSpPr>
+        <p:spPr/>
+        <p:txBody>
+          <a:bodyPr/>
+          <a:lstStyle/>
+          <a:p>
+            <a:r>
+              <a:rPr lang="en-GB" dirty="0" smtClean="0"/>
+              <a:t>Absorbers needs a </a:t>
+            </a:r>
+            <a:r>
+              <a:rPr lang="en-GB" i="1" dirty="0" smtClean="0"/>
+              <a:t>damped </a:t>
+            </a:r>
+            <a:r>
+              <a:rPr lang="en-GB" dirty="0" smtClean="0"/>
+              <a:t>frequency matching the frequency of the peak to eliminate</a:t>
+            </a:r>
+          </a:p>
+          <a:p>
+            <a:r>
+              <a:rPr lang="en-GB" dirty="0" smtClean="0"/>
+              <a:t>Can be derived from </a:t>
+            </a:r>
+            <a:r>
+              <a:rPr lang="en-GB" dirty="0" err="1" smtClean="0"/>
+              <a:t>databook</a:t>
+            </a:r>
+            <a:r>
+              <a:rPr lang="en-GB" dirty="0" smtClean="0"/>
+              <a:t> equations</a:t>
+            </a:r>
+          </a:p>
+          <a:p>
+            <a:r>
+              <a:rPr lang="en-GB" dirty="0" smtClean="0"/>
+              <a:t>[equation]</a:t>
+            </a:r>
+          </a:p>
+          <a:p>
+            <a:r>
+              <a:rPr lang="en-GB" dirty="0" smtClean="0"/>
+              <a:t>For simplicity, assume absorber damping equal to building damping</a:t>
+            </a:r>
+          </a:p>
+          <a:p>
+            <a:pPr>
+              <a:buNone/>
+            </a:pPr>
+            <a:endParaRPr lang="en-GB" dirty="0" smtClean="0"/>
+          </a:p>
+          <a:p>
+            <a:pPr>
+              <a:buNone/>
+            </a:pPr>
+            <a:endParaRPr lang="en-GB" dirty="0"/>
           </a:p>
         </p:txBody>
       </p:sp>
@@ -4393,7 +5154,7 @@
         </p:txBody>
       </p:sp>
       <mc:AlternateContent xmlns:mc="http://schemas.openxmlformats.org/markup-compatibility/2006">
-        <mc:Choice xmlns:a14="http://schemas.microsoft.com/office/drawing/2010/main" Requires="a14">
+        <mc:Choice xmlns="" xmlns:a14="http://schemas.microsoft.com/office/drawing/2010/main" Requires="a14">
           <p:sp>
             <p:nvSpPr>
               <p:cNvPr id="3" name="Content Placeholder 2"/>
@@ -4662,7 +5423,7 @@
             </p:nvSpPr>
             <p:spPr>
               <a:blipFill rotWithShape="1">
-                <a:blip r:embed="rId2"/>
+                <a:blip r:embed="rId2" cstate="print"/>
                 <a:stretch>
                   <a:fillRect l="-1630" t="-1752" r="-1037"/>
                 </a:stretch>
@@ -4777,7 +5538,7 @@
         </p:txBody>
       </p:sp>
       <mc:AlternateContent xmlns:mc="http://schemas.openxmlformats.org/markup-compatibility/2006">
-        <mc:Choice xmlns:a14="http://schemas.microsoft.com/office/drawing/2010/main" Requires="a14">
+        <mc:Choice xmlns="" xmlns:a14="http://schemas.microsoft.com/office/drawing/2010/main" Requires="a14">
           <p:sp>
             <p:nvSpPr>
               <p:cNvPr id="3" name="Content Placeholder 2"/>
@@ -5522,7 +6283,7 @@
             </p:nvSpPr>
             <p:spPr>
               <a:blipFill rotWithShape="1">
-                <a:blip r:embed="rId2"/>
+                <a:blip r:embed="rId2" cstate="print"/>
                 <a:stretch>
                   <a:fillRect l="-889" t="-2156"/>
                 </a:stretch>
@@ -5546,7 +6307,7 @@
     </p:spTree>
     <p:extLst>
       <p:ext uri="{BB962C8B-B14F-4D97-AF65-F5344CB8AC3E}">
-        <p14:creationId xmlns:p14="http://schemas.microsoft.com/office/powerpoint/2010/main" val="3854000270"/>
+        <p14:creationId xmlns="" xmlns:p14="http://schemas.microsoft.com/office/powerpoint/2010/main" val="3854000270"/>
       </p:ext>
     </p:extLst>
   </p:cSld>
@@ -5628,7 +6389,13 @@
               <a:rPr lang="en-GB" dirty="0" smtClean="0">
                 <a:latin typeface="+mj-lt"/>
               </a:rPr>
-              <a:t> integrator (like in mars </a:t>
+              <a:t> integrator (like in </a:t>
+            </a:r>
+            <a:r>
+              <a:rPr lang="en-GB" dirty="0" smtClean="0">
+                <a:latin typeface="+mj-lt"/>
+              </a:rPr>
+              <a:t>Mars </a:t>
             </a:r>
             <a:r>
               <a:rPr lang="en-GB" dirty="0" err="1" smtClean="0">
@@ -5679,14 +6446,7 @@
                 <a:latin typeface="+mj-lt"/>
                 <a:cs typeface="Times New Roman"/>
               </a:rPr>
-              <a:t>Works with vectors to find all displacements </a:t>
-            </a:r>
-            <a:r>
-              <a:rPr lang="en-GB" dirty="0" smtClean="0">
-                <a:latin typeface="+mj-lt"/>
-                <a:cs typeface="Times New Roman"/>
-              </a:rPr>
-              <a:t>simultaneously</a:t>
+              <a:t>Works with vectors to find all displacements simultaneously</a:t>
             </a:r>
             <a:endParaRPr lang="en-GB" dirty="0">
               <a:latin typeface="+mj-lt"/>
@@ -5750,7 +6510,7 @@
         </p:txBody>
       </p:sp>
       <mc:AlternateContent xmlns:mc="http://schemas.openxmlformats.org/markup-compatibility/2006">
-        <mc:Choice xmlns:a14="http://schemas.microsoft.com/office/drawing/2010/main" Requires="a14">
+        <mc:Choice xmlns="" xmlns:a14="http://schemas.microsoft.com/office/drawing/2010/main" Requires="a14">
           <p:sp>
             <p:nvSpPr>
               <p:cNvPr id="3" name="Content Placeholder 2"/>
@@ -6332,7 +7092,7 @@
             </p:nvSpPr>
             <p:spPr>
               <a:blipFill rotWithShape="1">
-                <a:blip r:embed="rId2"/>
+                <a:blip r:embed="rId2" cstate="print"/>
                 <a:stretch>
                   <a:fillRect l="-1481" t="-3504"/>
                 </a:stretch>
@@ -6358,6 +7118,13 @@
   <p:clrMapOvr>
     <a:masterClrMapping/>
   </p:clrMapOvr>
+  <p:timing>
+    <p:tnLst>
+      <p:par>
+        <p:cTn id="1" dur="indefinite" restart="never" nodeType="tmRoot"/>
+      </p:par>
+    </p:tnLst>
+  </p:timing>
 </p:sld>
 </file>
 
@@ -6424,13 +7191,8 @@
           <a:p>
             <a:r>
               <a:rPr lang="en-GB" dirty="0" smtClean="0"/>
-              <a:t>Can also be solved by solving a quadratic equation with matrix coefficients (quadratic eigenvalue problem</a:t>
-            </a:r>
-            <a:r>
-              <a:rPr lang="en-GB" dirty="0" smtClean="0"/>
-              <a:t>)</a:t>
-            </a:r>
-            <a:endParaRPr lang="en-GB" dirty="0" smtClean="0"/>
+              <a:t>Can also be solved by solving a quadratic equation with matrix coefficients (quadratic eigenvalue problem)</a:t>
+            </a:r>
           </a:p>
         </p:txBody>
       </p:sp>
@@ -6439,6 +7201,13 @@
   <p:clrMapOvr>
     <a:masterClrMapping/>
   </p:clrMapOvr>
+  <p:timing>
+    <p:tnLst>
+      <p:par>
+        <p:cTn id="1" dur="indefinite" restart="never" nodeType="tmRoot"/>
+      </p:par>
+    </p:tnLst>
+  </p:timing>
 </p:sld>
 </file>
 
@@ -6483,7 +7252,7 @@
         </p:txBody>
       </p:sp>
       <mc:AlternateContent xmlns:mc="http://schemas.openxmlformats.org/markup-compatibility/2006">
-        <mc:Choice xmlns:a14="http://schemas.microsoft.com/office/drawing/2010/main" Requires="a14">
+        <mc:Choice xmlns="" xmlns:a14="http://schemas.microsoft.com/office/drawing/2010/main" Requires="a14">
           <p:sp>
             <p:nvSpPr>
               <p:cNvPr id="3" name="Content Placeholder 2"/>
@@ -7802,7 +8571,7 @@
             </p:nvSpPr>
             <p:spPr>
               <a:blipFill rotWithShape="1">
-                <a:blip r:embed="rId2"/>
+                <a:blip r:embed="rId2" cstate="print"/>
                 <a:stretch>
                   <a:fillRect l="-222" t="-1213"/>
                 </a:stretch>
@@ -7826,13 +8595,20 @@
     </p:spTree>
     <p:extLst>
       <p:ext uri="{BB962C8B-B14F-4D97-AF65-F5344CB8AC3E}">
-        <p14:creationId xmlns:p14="http://schemas.microsoft.com/office/powerpoint/2010/main" val="2722850409"/>
+        <p14:creationId xmlns="" xmlns:p14="http://schemas.microsoft.com/office/powerpoint/2010/main" val="2722850409"/>
       </p:ext>
     </p:extLst>
   </p:cSld>
   <p:clrMapOvr>
     <a:masterClrMapping/>
   </p:clrMapOvr>
+  <p:timing>
+    <p:tnLst>
+      <p:par>
+        <p:cTn id="1" dur="indefinite" restart="never" nodeType="tmRoot"/>
+      </p:par>
+    </p:tnLst>
+  </p:timing>
 </p:sld>
 </file>
 
@@ -7900,6 +8676,13 @@
   <p:clrMapOvr>
     <a:masterClrMapping/>
   </p:clrMapOvr>
+  <p:timing>
+    <p:tnLst>
+      <p:par>
+        <p:cTn id="1" dur="indefinite" restart="never" nodeType="tmRoot"/>
+      </p:par>
+    </p:tnLst>
+  </p:timing>
 </p:sld>
 </file>
 

</xml_diff>